<commit_message>
New slides in presentation and month added to csv.
</commit_message>
<xml_diff>
--- a/Presentation.pptx
+++ b/Presentation.pptx
@@ -11,6 +11,13 @@
     <p:sldId id="259" r:id="rId5"/>
     <p:sldId id="260" r:id="rId6"/>
     <p:sldId id="261" r:id="rId7"/>
+    <p:sldId id="264" r:id="rId8"/>
+    <p:sldId id="270" r:id="rId9"/>
+    <p:sldId id="267" r:id="rId10"/>
+    <p:sldId id="268" r:id="rId11"/>
+    <p:sldId id="269" r:id="rId12"/>
+    <p:sldId id="271" r:id="rId13"/>
+    <p:sldId id="272" r:id="rId14"/>
   </p:sldIdLst>
   <p:sldSz cx="12192000" cy="6858000"/>
   <p:notesSz cx="6858000" cy="9144000"/>
@@ -115,6 +122,18 @@
     </p:ext>
   </p:extLst>
 </p:presentation>
+</file>
+
+<file path=ppt/commentAuthors.xml><?xml version="1.0" encoding="utf-8"?>
+<p:cmAuthorLst xmlns:a="http://schemas.openxmlformats.org/drawingml/2006/main" xmlns:r="http://schemas.openxmlformats.org/officeDocument/2006/relationships" xmlns:p="http://schemas.openxmlformats.org/presentationml/2006/main">
+  <p:cmAuthor id="1" name="Parsell, Julie" initials="PJ" lastIdx="0" clrIdx="0">
+    <p:extLst>
+      <p:ext uri="{19B8F6BF-5375-455C-9EA6-DF929625EA0E}">
+        <p15:presenceInfo xmlns:p15="http://schemas.microsoft.com/office/powerpoint/2012/main" userId="S-1-5-21-656003940-2852345394-2113978510-1254" providerId="AD"/>
+      </p:ext>
+    </p:extLst>
+  </p:cmAuthor>
+</p:cmAuthorLst>
 </file>
 
 <file path=ppt/diagrams/colors1.xml><?xml version="1.0" encoding="utf-8"?>
@@ -3499,7 +3518,7 @@
           <a:p>
             <a:fld id="{6927F936-5CE2-4828-9D7E-45400CE291FA}" type="datetimeFigureOut">
               <a:rPr lang="en-US" smtClean="0"/>
-              <a:t>8/12/2018</a:t>
+              <a:t>8/17/2018</a:t>
             </a:fld>
             <a:endParaRPr lang="en-US"/>
           </a:p>
@@ -3697,7 +3716,7 @@
           <a:p>
             <a:fld id="{6927F936-5CE2-4828-9D7E-45400CE291FA}" type="datetimeFigureOut">
               <a:rPr lang="en-US" smtClean="0"/>
-              <a:t>8/12/2018</a:t>
+              <a:t>8/17/2018</a:t>
             </a:fld>
             <a:endParaRPr lang="en-US"/>
           </a:p>
@@ -3905,7 +3924,7 @@
           <a:p>
             <a:fld id="{6927F936-5CE2-4828-9D7E-45400CE291FA}" type="datetimeFigureOut">
               <a:rPr lang="en-US" smtClean="0"/>
-              <a:t>8/12/2018</a:t>
+              <a:t>8/17/2018</a:t>
             </a:fld>
             <a:endParaRPr lang="en-US"/>
           </a:p>
@@ -4103,7 +4122,7 @@
           <a:p>
             <a:fld id="{6927F936-5CE2-4828-9D7E-45400CE291FA}" type="datetimeFigureOut">
               <a:rPr lang="en-US" smtClean="0"/>
-              <a:t>8/12/2018</a:t>
+              <a:t>8/17/2018</a:t>
             </a:fld>
             <a:endParaRPr lang="en-US"/>
           </a:p>
@@ -4378,7 +4397,7 @@
           <a:p>
             <a:fld id="{6927F936-5CE2-4828-9D7E-45400CE291FA}" type="datetimeFigureOut">
               <a:rPr lang="en-US" smtClean="0"/>
-              <a:t>8/12/2018</a:t>
+              <a:t>8/17/2018</a:t>
             </a:fld>
             <a:endParaRPr lang="en-US"/>
           </a:p>
@@ -4643,7 +4662,7 @@
           <a:p>
             <a:fld id="{6927F936-5CE2-4828-9D7E-45400CE291FA}" type="datetimeFigureOut">
               <a:rPr lang="en-US" smtClean="0"/>
-              <a:t>8/12/2018</a:t>
+              <a:t>8/17/2018</a:t>
             </a:fld>
             <a:endParaRPr lang="en-US"/>
           </a:p>
@@ -5055,7 +5074,7 @@
           <a:p>
             <a:fld id="{6927F936-5CE2-4828-9D7E-45400CE291FA}" type="datetimeFigureOut">
               <a:rPr lang="en-US" smtClean="0"/>
-              <a:t>8/12/2018</a:t>
+              <a:t>8/17/2018</a:t>
             </a:fld>
             <a:endParaRPr lang="en-US"/>
           </a:p>
@@ -5196,7 +5215,7 @@
           <a:p>
             <a:fld id="{6927F936-5CE2-4828-9D7E-45400CE291FA}" type="datetimeFigureOut">
               <a:rPr lang="en-US" smtClean="0"/>
-              <a:t>8/12/2018</a:t>
+              <a:t>8/17/2018</a:t>
             </a:fld>
             <a:endParaRPr lang="en-US"/>
           </a:p>
@@ -5309,7 +5328,7 @@
           <a:p>
             <a:fld id="{6927F936-5CE2-4828-9D7E-45400CE291FA}" type="datetimeFigureOut">
               <a:rPr lang="en-US" smtClean="0"/>
-              <a:t>8/12/2018</a:t>
+              <a:t>8/17/2018</a:t>
             </a:fld>
             <a:endParaRPr lang="en-US"/>
           </a:p>
@@ -5620,7 +5639,7 @@
           <a:p>
             <a:fld id="{6927F936-5CE2-4828-9D7E-45400CE291FA}" type="datetimeFigureOut">
               <a:rPr lang="en-US" smtClean="0"/>
-              <a:t>8/12/2018</a:t>
+              <a:t>8/17/2018</a:t>
             </a:fld>
             <a:endParaRPr lang="en-US"/>
           </a:p>
@@ -5908,7 +5927,7 @@
           <a:p>
             <a:fld id="{6927F936-5CE2-4828-9D7E-45400CE291FA}" type="datetimeFigureOut">
               <a:rPr lang="en-US" smtClean="0"/>
-              <a:t>8/12/2018</a:t>
+              <a:t>8/17/2018</a:t>
             </a:fld>
             <a:endParaRPr lang="en-US"/>
           </a:p>
@@ -6149,7 +6168,7 @@
           <a:p>
             <a:fld id="{6927F936-5CE2-4828-9D7E-45400CE291FA}" type="datetimeFigureOut">
               <a:rPr lang="en-US" smtClean="0"/>
-              <a:t>8/12/2018</a:t>
+              <a:t>8/17/2018</a:t>
             </a:fld>
             <a:endParaRPr lang="en-US"/>
           </a:p>
@@ -6831,23 +6850,1189 @@
           </a:bodyPr>
           <a:lstStyle/>
           <a:p>
+            <a:endParaRPr lang="en-US" sz="2400">
+              <a:solidFill>
+                <a:srgbClr val="000000"/>
+              </a:solidFill>
+            </a:endParaRPr>
+          </a:p>
+          <a:p>
+            <a:pPr marL="0" indent="0">
+              <a:buNone/>
+            </a:pPr>
+            <a:r>
+              <a:rPr lang="en-US" sz="2400">
+                <a:solidFill>
+                  <a:srgbClr val="000000"/>
+                </a:solidFill>
+              </a:rPr>
+              <a:t>Our hypothesis predicts that there is a correlation between crime and time of year.  Crime rates will fluctuate between day of the week, season, and lunar cycle. </a:t>
+            </a:r>
             <a:endParaRPr lang="en-US" sz="2400" dirty="0">
               <a:solidFill>
                 <a:srgbClr val="000000"/>
               </a:solidFill>
             </a:endParaRPr>
           </a:p>
-          <a:p>
-            <a:pPr marL="0" indent="0">
-              <a:buNone/>
-            </a:pPr>
+        </p:txBody>
+      </p:sp>
+    </p:spTree>
+    <p:extLst>
+      <p:ext uri="{BB962C8B-B14F-4D97-AF65-F5344CB8AC3E}">
+        <p14:creationId xmlns:p14="http://schemas.microsoft.com/office/powerpoint/2010/main" val="1314926321"/>
+      </p:ext>
+    </p:extLst>
+  </p:cSld>
+  <p:clrMapOvr>
+    <a:masterClrMapping/>
+  </p:clrMapOvr>
+</p:sld>
+</file>
+
+<file path=ppt/slides/slide10.xml><?xml version="1.0" encoding="utf-8"?>
+<p:sld xmlns:a="http://schemas.openxmlformats.org/drawingml/2006/main" xmlns:r="http://schemas.openxmlformats.org/officeDocument/2006/relationships" xmlns:p="http://schemas.openxmlformats.org/presentationml/2006/main">
+  <p:cSld>
+    <p:bg>
+      <p:bgPr>
+        <a:gradFill>
+          <a:gsLst>
+            <a:gs pos="20000">
+              <a:schemeClr val="tx1">
+                <a:alpha val="95000"/>
+                <a:lumMod val="65000"/>
+                <a:lumOff val="35000"/>
+              </a:schemeClr>
+            </a:gs>
+            <a:gs pos="74000">
+              <a:schemeClr val="accent1">
+                <a:lumMod val="45000"/>
+                <a:lumOff val="55000"/>
+              </a:schemeClr>
+            </a:gs>
+            <a:gs pos="56000">
+              <a:schemeClr val="accent1">
+                <a:lumMod val="45000"/>
+                <a:lumOff val="55000"/>
+              </a:schemeClr>
+            </a:gs>
+            <a:gs pos="98000">
+              <a:schemeClr val="accent1">
+                <a:lumMod val="30000"/>
+                <a:lumOff val="70000"/>
+              </a:schemeClr>
+            </a:gs>
+          </a:gsLst>
+          <a:lin ang="13200000" scaled="0"/>
+        </a:gradFill>
+        <a:effectLst/>
+      </p:bgPr>
+    </p:bg>
+    <p:spTree>
+      <p:nvGrpSpPr>
+        <p:cNvPr id="1" name=""/>
+        <p:cNvGrpSpPr/>
+        <p:nvPr/>
+      </p:nvGrpSpPr>
+      <p:grpSpPr>
+        <a:xfrm>
+          <a:off x="0" y="0"/>
+          <a:ext cx="0" cy="0"/>
+          <a:chOff x="0" y="0"/>
+          <a:chExt cx="0" cy="0"/>
+        </a:xfrm>
+      </p:grpSpPr>
+      <p:sp>
+        <p:nvSpPr>
+          <p:cNvPr id="14" name="Rectangle 7">
+            <a:extLst>
+              <a:ext uri="{FF2B5EF4-FFF2-40B4-BE49-F238E27FC236}">
+                <a16:creationId xmlns:a16="http://schemas.microsoft.com/office/drawing/2014/main" id="{8D70B121-56F4-4848-B38B-182089D909FA}"/>
+              </a:ext>
+              <a:ext uri="{C183D7F6-B498-43B3-948B-1728B52AA6E4}">
+                <adec:decorative xmlns:adec="http://schemas.microsoft.com/office/drawing/2017/decorative" val="1"/>
+              </a:ext>
+            </a:extLst>
+          </p:cNvPr>
+          <p:cNvSpPr>
+            <a:spLocks noGrp="1" noRot="1" noChangeAspect="1" noMove="1" noResize="1" noEditPoints="1" noAdjustHandles="1" noChangeArrowheads="1" noChangeShapeType="1" noTextEdit="1"/>
+          </p:cNvSpPr>
+          <p:nvPr>
+            <p:extLst>
+              <p:ext uri="{386F3935-93C4-4BCD-93E2-E3B085C9AB24}">
+                <p16:designElem xmlns:p16="http://schemas.microsoft.com/office/powerpoint/2015/main" val="1"/>
+              </p:ext>
+            </p:extLst>
+          </p:nvPr>
+        </p:nvSpPr>
+        <p:spPr bwMode="ltGray">
+          <a:xfrm>
+            <a:off x="321564" y="320040"/>
+            <a:ext cx="11548872" cy="6217920"/>
+          </a:xfrm>
+          <a:prstGeom prst="rect">
+            <a:avLst/>
+          </a:prstGeom>
+          <a:solidFill>
+            <a:schemeClr val="tx1">
+              <a:alpha val="8000"/>
+            </a:schemeClr>
+          </a:solidFill>
+          <a:ln w="127000" cap="sq" cmpd="thinThick">
+            <a:noFill/>
+          </a:ln>
+        </p:spPr>
+        <p:style>
+          <a:lnRef idx="2">
+            <a:schemeClr val="accent1">
+              <a:shade val="50000"/>
+            </a:schemeClr>
+          </a:lnRef>
+          <a:fillRef idx="1">
+            <a:schemeClr val="accent1"/>
+          </a:fillRef>
+          <a:effectRef idx="0">
+            <a:schemeClr val="accent1"/>
+          </a:effectRef>
+          <a:fontRef idx="minor">
+            <a:schemeClr val="lt1"/>
+          </a:fontRef>
+        </p:style>
+        <p:txBody>
+          <a:bodyPr rtlCol="0" anchor="ctr"/>
+          <a:lstStyle/>
+          <a:p>
+            <a:pPr algn="ctr"/>
+            <a:endParaRPr lang="en-US"/>
+          </a:p>
+        </p:txBody>
+      </p:sp>
+      <p:sp>
+        <p:nvSpPr>
+          <p:cNvPr id="2" name="Title 1">
+            <a:extLst>
+              <a:ext uri="{FF2B5EF4-FFF2-40B4-BE49-F238E27FC236}">
+                <a16:creationId xmlns:a16="http://schemas.microsoft.com/office/drawing/2014/main" id="{CCBEC4D0-FD31-460F-BC5D-F79847C0A7A8}"/>
+              </a:ext>
+            </a:extLst>
+          </p:cNvPr>
+          <p:cNvSpPr>
+            <a:spLocks noGrp="1"/>
+          </p:cNvSpPr>
+          <p:nvPr>
+            <p:ph type="title"/>
+          </p:nvPr>
+        </p:nvSpPr>
+        <p:spPr>
+          <a:xfrm>
+            <a:off x="838200" y="123007"/>
+            <a:ext cx="11032230" cy="1703150"/>
+          </a:xfrm>
+        </p:spPr>
+        <p:txBody>
+          <a:bodyPr>
+            <a:normAutofit/>
+          </a:bodyPr>
+          <a:lstStyle/>
+          <a:p>
+            <a:r>
+              <a:rPr lang="en-US" sz="2000" b="1" dirty="0">
+                <a:solidFill>
+                  <a:schemeClr val="bg1"/>
+                </a:solidFill>
+              </a:rPr>
+              <a:t>Full Moon </a:t>
+            </a:r>
+            <a:r>
+              <a:rPr lang="en-US" sz="2000" dirty="0">
+                <a:solidFill>
+                  <a:schemeClr val="bg1"/>
+                </a:solidFill>
+              </a:rPr>
+              <a:t>appears in the night sky when the Sun and the Moon are aligned on opposite sides of Earth.  Full Moon is the brightest phase.</a:t>
+            </a:r>
+            <a:endParaRPr lang="en-US" sz="1400" dirty="0">
+              <a:solidFill>
+                <a:schemeClr val="bg1"/>
+              </a:solidFill>
+            </a:endParaRPr>
+          </a:p>
+        </p:txBody>
+      </p:sp>
+      <p:cxnSp>
+        <p:nvCxnSpPr>
+          <p:cNvPr id="15" name="Straight Connector 9">
+            <a:extLst>
+              <a:ext uri="{FF2B5EF4-FFF2-40B4-BE49-F238E27FC236}">
+                <a16:creationId xmlns:a16="http://schemas.microsoft.com/office/drawing/2014/main" id="{2D72A2C9-F3CA-4216-8BAD-FA4C970C3C4E}"/>
+              </a:ext>
+              <a:ext uri="{C183D7F6-B498-43B3-948B-1728B52AA6E4}">
+                <adec:decorative xmlns:adec="http://schemas.microsoft.com/office/drawing/2017/decorative" val="1"/>
+              </a:ext>
+            </a:extLst>
+          </p:cNvPr>
+          <p:cNvCxnSpPr>
+            <a:cxnSpLocks noGrp="1" noRot="1" noChangeAspect="1" noMove="1" noResize="1" noEditPoints="1" noAdjustHandles="1" noChangeArrowheads="1" noChangeShapeType="1"/>
+          </p:cNvCxnSpPr>
+          <p:nvPr>
+            <p:extLst>
+              <p:ext uri="{386F3935-93C4-4BCD-93E2-E3B085C9AB24}">
+                <p16:designElem xmlns:p16="http://schemas.microsoft.com/office/powerpoint/2015/main" val="1"/>
+              </p:ext>
+            </p:extLst>
+          </p:nvPr>
+        </p:nvCxnSpPr>
+        <p:spPr>
+          <a:xfrm>
+            <a:off x="4654296" y="2057400"/>
+            <a:ext cx="0" cy="2743200"/>
+          </a:xfrm>
+          <a:prstGeom prst="line">
+            <a:avLst/>
+          </a:prstGeom>
+          <a:ln w="19050">
+            <a:solidFill>
+              <a:schemeClr val="tx1">
+                <a:lumMod val="85000"/>
+                <a:lumOff val="15000"/>
+              </a:schemeClr>
+            </a:solidFill>
+          </a:ln>
+        </p:spPr>
+        <p:style>
+          <a:lnRef idx="1">
+            <a:schemeClr val="accent1"/>
+          </a:lnRef>
+          <a:fillRef idx="0">
+            <a:schemeClr val="accent1"/>
+          </a:fillRef>
+          <a:effectRef idx="0">
+            <a:schemeClr val="accent1"/>
+          </a:effectRef>
+          <a:fontRef idx="minor">
+            <a:schemeClr val="tx1"/>
+          </a:fontRef>
+        </p:style>
+      </p:cxnSp>
+      <p:pic>
+        <p:nvPicPr>
+          <p:cNvPr id="9" name="Content Placeholder 8">
+            <a:extLst>
+              <a:ext uri="{FF2B5EF4-FFF2-40B4-BE49-F238E27FC236}">
+                <a16:creationId xmlns:a16="http://schemas.microsoft.com/office/drawing/2014/main" id="{DDA872B1-2D96-4F56-A14B-3DCC863F00B9}"/>
+              </a:ext>
+            </a:extLst>
+          </p:cNvPr>
+          <p:cNvPicPr>
+            <a:picLocks noGrp="1" noChangeAspect="1" noChangeArrowheads="1"/>
+          </p:cNvPicPr>
+          <p:nvPr>
+            <p:ph idx="1"/>
+          </p:nvPr>
+        </p:nvPicPr>
+        <p:blipFill>
+          <a:blip r:embed="rId2">
+            <a:extLst>
+              <a:ext uri="{28A0092B-C50C-407E-A947-70E740481C1C}">
+                <a14:useLocalDpi xmlns:a14="http://schemas.microsoft.com/office/drawing/2010/main" val="0"/>
+              </a:ext>
+            </a:extLst>
+          </a:blip>
+          <a:stretch>
+            <a:fillRect/>
+          </a:stretch>
+        </p:blipFill>
+        <p:spPr bwMode="auto">
+          <a:xfrm>
+            <a:off x="692615" y="1595892"/>
+            <a:ext cx="6886179" cy="4588827"/>
+          </a:xfrm>
+          <a:prstGeom prst="rect">
+            <a:avLst/>
+          </a:prstGeom>
+          <a:noFill/>
+          <a:extLst>
+            <a:ext uri="{909E8E84-426E-40DD-AFC4-6F175D3DCCD1}">
+              <a14:hiddenFill xmlns:a14="http://schemas.microsoft.com/office/drawing/2010/main">
+                <a:solidFill>
+                  <a:srgbClr val="FFFFFF"/>
+                </a:solidFill>
+              </a14:hiddenFill>
+            </a:ext>
+          </a:extLst>
+        </p:spPr>
+      </p:pic>
+      <p:sp>
+        <p:nvSpPr>
+          <p:cNvPr id="4" name="AutoShape 2" descr="Image result for dark side of the moon">
+            <a:extLst>
+              <a:ext uri="{FF2B5EF4-FFF2-40B4-BE49-F238E27FC236}">
+                <a16:creationId xmlns:a16="http://schemas.microsoft.com/office/drawing/2014/main" id="{6CD22A2B-A41D-48DF-B82F-7BC24EFB3944}"/>
+              </a:ext>
+            </a:extLst>
+          </p:cNvPr>
+          <p:cNvSpPr>
+            <a:spLocks noChangeAspect="1" noChangeArrowheads="1"/>
+          </p:cNvSpPr>
+          <p:nvPr/>
+        </p:nvSpPr>
+        <p:spPr bwMode="auto">
+          <a:xfrm>
+            <a:off x="5943600" y="3276600"/>
+            <a:ext cx="304800" cy="304800"/>
+          </a:xfrm>
+          <a:prstGeom prst="rect">
+            <a:avLst/>
+          </a:prstGeom>
+          <a:noFill/>
+          <a:extLst>
+            <a:ext uri="{909E8E84-426E-40DD-AFC4-6F175D3DCCD1}">
+              <a14:hiddenFill xmlns:a14="http://schemas.microsoft.com/office/drawing/2010/main">
+                <a:solidFill>
+                  <a:srgbClr val="FFFFFF"/>
+                </a:solidFill>
+              </a14:hiddenFill>
+            </a:ext>
+          </a:extLst>
+        </p:spPr>
+        <p:txBody>
+          <a:bodyPr vert="horz" wrap="square" lIns="91440" tIns="45720" rIns="91440" bIns="45720" numCol="1" anchor="t" anchorCtr="0" compatLnSpc="1">
+            <a:prstTxWarp prst="textNoShape">
+              <a:avLst/>
+            </a:prstTxWarp>
+          </a:bodyPr>
+          <a:lstStyle/>
+          <a:p>
+            <a:endParaRPr lang="en-US"/>
+          </a:p>
+        </p:txBody>
+      </p:sp>
+      <p:pic>
+        <p:nvPicPr>
+          <p:cNvPr id="11" name="Content Placeholder 8">
+            <a:extLst>
+              <a:ext uri="{FF2B5EF4-FFF2-40B4-BE49-F238E27FC236}">
+                <a16:creationId xmlns:a16="http://schemas.microsoft.com/office/drawing/2014/main" id="{6DECA978-7251-46E8-9A9F-3550A58C3FB5}"/>
+              </a:ext>
+            </a:extLst>
+          </p:cNvPr>
+          <p:cNvPicPr>
+            <a:picLocks noChangeAspect="1"/>
+          </p:cNvPicPr>
+          <p:nvPr/>
+        </p:nvPicPr>
+        <p:blipFill>
+          <a:blip r:embed="rId3">
+            <a:extLst>
+              <a:ext uri="{28A0092B-C50C-407E-A947-70E740481C1C}">
+                <a14:useLocalDpi xmlns:a14="http://schemas.microsoft.com/office/drawing/2010/main" val="0"/>
+              </a:ext>
+            </a:extLst>
+          </a:blip>
+          <a:stretch>
+            <a:fillRect/>
+          </a:stretch>
+        </p:blipFill>
+        <p:spPr>
+          <a:xfrm>
+            <a:off x="11408155" y="5949019"/>
+            <a:ext cx="369820" cy="554730"/>
+          </a:xfrm>
+          <a:prstGeom prst="rect">
+            <a:avLst/>
+          </a:prstGeom>
+        </p:spPr>
+      </p:pic>
+    </p:spTree>
+    <p:extLst>
+      <p:ext uri="{BB962C8B-B14F-4D97-AF65-F5344CB8AC3E}">
+        <p14:creationId xmlns:p14="http://schemas.microsoft.com/office/powerpoint/2010/main" val="432185454"/>
+      </p:ext>
+    </p:extLst>
+  </p:cSld>
+  <p:clrMapOvr>
+    <a:masterClrMapping/>
+  </p:clrMapOvr>
+</p:sld>
+</file>
+
+<file path=ppt/slides/slide11.xml><?xml version="1.0" encoding="utf-8"?>
+<p:sld xmlns:a="http://schemas.openxmlformats.org/drawingml/2006/main" xmlns:r="http://schemas.openxmlformats.org/officeDocument/2006/relationships" xmlns:p="http://schemas.openxmlformats.org/presentationml/2006/main">
+  <p:cSld>
+    <p:bg>
+      <p:bgPr>
+        <a:gradFill>
+          <a:gsLst>
+            <a:gs pos="93000">
+              <a:schemeClr val="tx1">
+                <a:lumMod val="75000"/>
+                <a:lumOff val="25000"/>
+              </a:schemeClr>
+            </a:gs>
+            <a:gs pos="30000">
+              <a:schemeClr val="accent1">
+                <a:lumMod val="45000"/>
+                <a:lumOff val="55000"/>
+              </a:schemeClr>
+            </a:gs>
+            <a:gs pos="15000">
+              <a:schemeClr val="accent1">
+                <a:lumMod val="45000"/>
+                <a:lumOff val="55000"/>
+              </a:schemeClr>
+            </a:gs>
+            <a:gs pos="0">
+              <a:schemeClr val="accent1">
+                <a:lumMod val="30000"/>
+                <a:lumOff val="70000"/>
+              </a:schemeClr>
+            </a:gs>
+          </a:gsLst>
+          <a:lin ang="13200000" scaled="0"/>
+        </a:gradFill>
+        <a:effectLst/>
+      </p:bgPr>
+    </p:bg>
+    <p:spTree>
+      <p:nvGrpSpPr>
+        <p:cNvPr id="1" name=""/>
+        <p:cNvGrpSpPr/>
+        <p:nvPr/>
+      </p:nvGrpSpPr>
+      <p:grpSpPr>
+        <a:xfrm>
+          <a:off x="0" y="0"/>
+          <a:ext cx="0" cy="0"/>
+          <a:chOff x="0" y="0"/>
+          <a:chExt cx="0" cy="0"/>
+        </a:xfrm>
+      </p:grpSpPr>
+      <p:sp>
+        <p:nvSpPr>
+          <p:cNvPr id="14" name="Rectangle 7">
+            <a:extLst>
+              <a:ext uri="{FF2B5EF4-FFF2-40B4-BE49-F238E27FC236}">
+                <a16:creationId xmlns:a16="http://schemas.microsoft.com/office/drawing/2014/main" id="{8D70B121-56F4-4848-B38B-182089D909FA}"/>
+              </a:ext>
+              <a:ext uri="{C183D7F6-B498-43B3-948B-1728B52AA6E4}">
+                <adec:decorative xmlns:adec="http://schemas.microsoft.com/office/drawing/2017/decorative" val="1"/>
+              </a:ext>
+            </a:extLst>
+          </p:cNvPr>
+          <p:cNvSpPr>
+            <a:spLocks noGrp="1" noRot="1" noChangeAspect="1" noMove="1" noResize="1" noEditPoints="1" noAdjustHandles="1" noChangeArrowheads="1" noChangeShapeType="1" noTextEdit="1"/>
+          </p:cNvSpPr>
+          <p:nvPr>
+            <p:extLst>
+              <p:ext uri="{386F3935-93C4-4BCD-93E2-E3B085C9AB24}">
+                <p16:designElem xmlns:p16="http://schemas.microsoft.com/office/powerpoint/2015/main" val="1"/>
+              </p:ext>
+            </p:extLst>
+          </p:nvPr>
+        </p:nvSpPr>
+        <p:spPr bwMode="ltGray">
+          <a:xfrm>
+            <a:off x="321564" y="320040"/>
+            <a:ext cx="11548872" cy="6217920"/>
+          </a:xfrm>
+          <a:prstGeom prst="rect">
+            <a:avLst/>
+          </a:prstGeom>
+          <a:solidFill>
+            <a:schemeClr val="tx1">
+              <a:alpha val="8000"/>
+            </a:schemeClr>
+          </a:solidFill>
+          <a:ln w="127000" cap="sq" cmpd="thinThick">
+            <a:noFill/>
+          </a:ln>
+        </p:spPr>
+        <p:style>
+          <a:lnRef idx="2">
+            <a:schemeClr val="accent1">
+              <a:shade val="50000"/>
+            </a:schemeClr>
+          </a:lnRef>
+          <a:fillRef idx="1">
+            <a:schemeClr val="accent1"/>
+          </a:fillRef>
+          <a:effectRef idx="0">
+            <a:schemeClr val="accent1"/>
+          </a:effectRef>
+          <a:fontRef idx="minor">
+            <a:schemeClr val="lt1"/>
+          </a:fontRef>
+        </p:style>
+        <p:txBody>
+          <a:bodyPr rtlCol="0" anchor="ctr"/>
+          <a:lstStyle/>
+          <a:p>
+            <a:pPr algn="ctr"/>
+            <a:endParaRPr lang="en-US"/>
+          </a:p>
+        </p:txBody>
+      </p:sp>
+      <p:sp>
+        <p:nvSpPr>
+          <p:cNvPr id="2" name="Title 1">
+            <a:extLst>
+              <a:ext uri="{FF2B5EF4-FFF2-40B4-BE49-F238E27FC236}">
+                <a16:creationId xmlns:a16="http://schemas.microsoft.com/office/drawing/2014/main" id="{CCBEC4D0-FD31-460F-BC5D-F79847C0A7A8}"/>
+              </a:ext>
+            </a:extLst>
+          </p:cNvPr>
+          <p:cNvSpPr>
+            <a:spLocks noGrp="1"/>
+          </p:cNvSpPr>
+          <p:nvPr>
+            <p:ph type="title"/>
+          </p:nvPr>
+        </p:nvSpPr>
+        <p:spPr>
+          <a:xfrm>
+            <a:off x="838200" y="123007"/>
+            <a:ext cx="11032230" cy="1703150"/>
+          </a:xfrm>
+        </p:spPr>
+        <p:txBody>
+          <a:bodyPr>
+            <a:normAutofit/>
+          </a:bodyPr>
+          <a:lstStyle/>
+          <a:p>
+            <a:r>
+              <a:rPr lang="en-US" sz="2000" b="1" dirty="0">
+                <a:solidFill>
+                  <a:schemeClr val="bg1"/>
+                </a:solidFill>
+              </a:rPr>
+              <a:t>The Last Quarter </a:t>
+            </a:r>
+            <a:r>
+              <a:rPr lang="en-US" sz="2000" dirty="0">
+                <a:solidFill>
+                  <a:schemeClr val="bg1"/>
+                </a:solidFill>
+              </a:rPr>
+              <a:t>(aka Third </a:t>
+            </a:r>
+            <a:r>
+              <a:rPr lang="en-US" sz="2000" dirty="0" err="1">
+                <a:solidFill>
+                  <a:schemeClr val="bg1"/>
+                </a:solidFill>
+              </a:rPr>
+              <a:t>Quarter0occurs</a:t>
+            </a:r>
+            <a:r>
+              <a:rPr lang="en-US" sz="2000" dirty="0">
+                <a:solidFill>
+                  <a:schemeClr val="bg1"/>
+                </a:solidFill>
+              </a:rPr>
+              <a:t> the moment the opposite half of the Moon is illuminated compared to the First Quarter Moon.</a:t>
+            </a:r>
+          </a:p>
+        </p:txBody>
+      </p:sp>
+      <p:cxnSp>
+        <p:nvCxnSpPr>
+          <p:cNvPr id="15" name="Straight Connector 9">
+            <a:extLst>
+              <a:ext uri="{FF2B5EF4-FFF2-40B4-BE49-F238E27FC236}">
+                <a16:creationId xmlns:a16="http://schemas.microsoft.com/office/drawing/2014/main" id="{2D72A2C9-F3CA-4216-8BAD-FA4C970C3C4E}"/>
+              </a:ext>
+              <a:ext uri="{C183D7F6-B498-43B3-948B-1728B52AA6E4}">
+                <adec:decorative xmlns:adec="http://schemas.microsoft.com/office/drawing/2017/decorative" val="1"/>
+              </a:ext>
+            </a:extLst>
+          </p:cNvPr>
+          <p:cNvCxnSpPr>
+            <a:cxnSpLocks noGrp="1" noRot="1" noChangeAspect="1" noMove="1" noResize="1" noEditPoints="1" noAdjustHandles="1" noChangeArrowheads="1" noChangeShapeType="1"/>
+          </p:cNvCxnSpPr>
+          <p:nvPr>
+            <p:extLst>
+              <p:ext uri="{386F3935-93C4-4BCD-93E2-E3B085C9AB24}">
+                <p16:designElem xmlns:p16="http://schemas.microsoft.com/office/powerpoint/2015/main" val="1"/>
+              </p:ext>
+            </p:extLst>
+          </p:nvPr>
+        </p:nvCxnSpPr>
+        <p:spPr>
+          <a:xfrm>
+            <a:off x="4654296" y="2057400"/>
+            <a:ext cx="0" cy="2743200"/>
+          </a:xfrm>
+          <a:prstGeom prst="line">
+            <a:avLst/>
+          </a:prstGeom>
+          <a:ln w="19050">
+            <a:solidFill>
+              <a:schemeClr val="tx1">
+                <a:lumMod val="85000"/>
+                <a:lumOff val="15000"/>
+              </a:schemeClr>
+            </a:solidFill>
+          </a:ln>
+        </p:spPr>
+        <p:style>
+          <a:lnRef idx="1">
+            <a:schemeClr val="accent1"/>
+          </a:lnRef>
+          <a:fillRef idx="0">
+            <a:schemeClr val="accent1"/>
+          </a:fillRef>
+          <a:effectRef idx="0">
+            <a:schemeClr val="accent1"/>
+          </a:effectRef>
+          <a:fontRef idx="minor">
+            <a:schemeClr val="tx1"/>
+          </a:fontRef>
+        </p:style>
+      </p:cxnSp>
+      <p:pic>
+        <p:nvPicPr>
+          <p:cNvPr id="9" name="Content Placeholder 8">
+            <a:extLst>
+              <a:ext uri="{FF2B5EF4-FFF2-40B4-BE49-F238E27FC236}">
+                <a16:creationId xmlns:a16="http://schemas.microsoft.com/office/drawing/2014/main" id="{DDA872B1-2D96-4F56-A14B-3DCC863F00B9}"/>
+              </a:ext>
+            </a:extLst>
+          </p:cNvPr>
+          <p:cNvPicPr>
+            <a:picLocks noGrp="1" noChangeAspect="1" noChangeArrowheads="1"/>
+          </p:cNvPicPr>
+          <p:nvPr>
+            <p:ph idx="1"/>
+          </p:nvPr>
+        </p:nvPicPr>
+        <p:blipFill>
+          <a:blip r:embed="rId2">
+            <a:extLst>
+              <a:ext uri="{28A0092B-C50C-407E-A947-70E740481C1C}">
+                <a14:useLocalDpi xmlns:a14="http://schemas.microsoft.com/office/drawing/2010/main" val="0"/>
+              </a:ext>
+            </a:extLst>
+          </a:blip>
+          <a:stretch>
+            <a:fillRect/>
+          </a:stretch>
+        </p:blipFill>
+        <p:spPr bwMode="auto">
+          <a:xfrm>
+            <a:off x="694140" y="1596908"/>
+            <a:ext cx="6883129" cy="4586795"/>
+          </a:xfrm>
+          <a:prstGeom prst="rect">
+            <a:avLst/>
+          </a:prstGeom>
+          <a:noFill/>
+          <a:extLst>
+            <a:ext uri="{909E8E84-426E-40DD-AFC4-6F175D3DCCD1}">
+              <a14:hiddenFill xmlns:a14="http://schemas.microsoft.com/office/drawing/2010/main">
+                <a:solidFill>
+                  <a:srgbClr val="FFFFFF"/>
+                </a:solidFill>
+              </a14:hiddenFill>
+            </a:ext>
+          </a:extLst>
+        </p:spPr>
+      </p:pic>
+      <p:sp>
+        <p:nvSpPr>
+          <p:cNvPr id="4" name="AutoShape 2" descr="Image result for dark side of the moon">
+            <a:extLst>
+              <a:ext uri="{FF2B5EF4-FFF2-40B4-BE49-F238E27FC236}">
+                <a16:creationId xmlns:a16="http://schemas.microsoft.com/office/drawing/2014/main" id="{6CD22A2B-A41D-48DF-B82F-7BC24EFB3944}"/>
+              </a:ext>
+            </a:extLst>
+          </p:cNvPr>
+          <p:cNvSpPr>
+            <a:spLocks noChangeAspect="1" noChangeArrowheads="1"/>
+          </p:cNvSpPr>
+          <p:nvPr/>
+        </p:nvSpPr>
+        <p:spPr bwMode="auto">
+          <a:xfrm>
+            <a:off x="5943600" y="3276600"/>
+            <a:ext cx="304800" cy="304800"/>
+          </a:xfrm>
+          <a:prstGeom prst="rect">
+            <a:avLst/>
+          </a:prstGeom>
+          <a:noFill/>
+          <a:extLst>
+            <a:ext uri="{909E8E84-426E-40DD-AFC4-6F175D3DCCD1}">
+              <a14:hiddenFill xmlns:a14="http://schemas.microsoft.com/office/drawing/2010/main">
+                <a:solidFill>
+                  <a:srgbClr val="FFFFFF"/>
+                </a:solidFill>
+              </a14:hiddenFill>
+            </a:ext>
+          </a:extLst>
+        </p:spPr>
+        <p:txBody>
+          <a:bodyPr vert="horz" wrap="square" lIns="91440" tIns="45720" rIns="91440" bIns="45720" numCol="1" anchor="t" anchorCtr="0" compatLnSpc="1">
+            <a:prstTxWarp prst="textNoShape">
+              <a:avLst/>
+            </a:prstTxWarp>
+          </a:bodyPr>
+          <a:lstStyle/>
+          <a:p>
+            <a:endParaRPr lang="en-US"/>
+          </a:p>
+        </p:txBody>
+      </p:sp>
+    </p:spTree>
+    <p:extLst>
+      <p:ext uri="{BB962C8B-B14F-4D97-AF65-F5344CB8AC3E}">
+        <p14:creationId xmlns:p14="http://schemas.microsoft.com/office/powerpoint/2010/main" val="990505956"/>
+      </p:ext>
+    </p:extLst>
+  </p:cSld>
+  <p:clrMapOvr>
+    <a:masterClrMapping/>
+  </p:clrMapOvr>
+</p:sld>
+</file>
+
+<file path=ppt/slides/slide12.xml><?xml version="1.0" encoding="utf-8"?>
+<p:sld xmlns:a="http://schemas.openxmlformats.org/drawingml/2006/main" xmlns:r="http://schemas.openxmlformats.org/officeDocument/2006/relationships" xmlns:p="http://schemas.openxmlformats.org/presentationml/2006/main">
+  <p:cSld>
+    <p:spTree>
+      <p:nvGrpSpPr>
+        <p:cNvPr id="1" name=""/>
+        <p:cNvGrpSpPr/>
+        <p:nvPr/>
+      </p:nvGrpSpPr>
+      <p:grpSpPr>
+        <a:xfrm>
+          <a:off x="0" y="0"/>
+          <a:ext cx="0" cy="0"/>
+          <a:chOff x="0" y="0"/>
+          <a:chExt cx="0" cy="0"/>
+        </a:xfrm>
+      </p:grpSpPr>
+      <p:sp>
+        <p:nvSpPr>
+          <p:cNvPr id="2" name="Title 1">
+            <a:extLst>
+              <a:ext uri="{FF2B5EF4-FFF2-40B4-BE49-F238E27FC236}">
+                <a16:creationId xmlns:a16="http://schemas.microsoft.com/office/drawing/2014/main" id="{86CD0119-38B0-48FB-B57C-A730F608968B}"/>
+              </a:ext>
+            </a:extLst>
+          </p:cNvPr>
+          <p:cNvSpPr>
+            <a:spLocks noGrp="1"/>
+          </p:cNvSpPr>
+          <p:nvPr>
+            <p:ph type="title"/>
+          </p:nvPr>
+        </p:nvSpPr>
+        <p:spPr/>
+        <p:txBody>
+          <a:bodyPr/>
+          <a:lstStyle/>
+          <a:p>
+            <a:endParaRPr lang="en-US" dirty="0"/>
+          </a:p>
+        </p:txBody>
+      </p:sp>
+      <p:sp>
+        <p:nvSpPr>
+          <p:cNvPr id="3" name="Content Placeholder 2">
+            <a:extLst>
+              <a:ext uri="{FF2B5EF4-FFF2-40B4-BE49-F238E27FC236}">
+                <a16:creationId xmlns:a16="http://schemas.microsoft.com/office/drawing/2014/main" id="{340DA6D6-46F2-4485-9C02-79ADBEB2ED3F}"/>
+              </a:ext>
+            </a:extLst>
+          </p:cNvPr>
+          <p:cNvSpPr>
+            <a:spLocks noGrp="1"/>
+          </p:cNvSpPr>
+          <p:nvPr>
+            <p:ph idx="1"/>
+          </p:nvPr>
+        </p:nvSpPr>
+        <p:spPr/>
+        <p:txBody>
+          <a:bodyPr/>
+          <a:lstStyle/>
+          <a:p>
+            <a:endParaRPr lang="en-US" dirty="0"/>
+          </a:p>
+        </p:txBody>
+      </p:sp>
+    </p:spTree>
+    <p:extLst>
+      <p:ext uri="{BB962C8B-B14F-4D97-AF65-F5344CB8AC3E}">
+        <p14:creationId xmlns:p14="http://schemas.microsoft.com/office/powerpoint/2010/main" val="2925863278"/>
+      </p:ext>
+    </p:extLst>
+  </p:cSld>
+  <p:clrMapOvr>
+    <a:masterClrMapping/>
+  </p:clrMapOvr>
+</p:sld>
+</file>
+
+<file path=ppt/slides/slide13.xml><?xml version="1.0" encoding="utf-8"?>
+<p:sld xmlns:a="http://schemas.openxmlformats.org/drawingml/2006/main" xmlns:r="http://schemas.openxmlformats.org/officeDocument/2006/relationships" xmlns:p="http://schemas.openxmlformats.org/presentationml/2006/main">
+  <p:cSld>
+    <p:bg>
+      <p:bgPr>
+        <a:solidFill>
+          <a:schemeClr val="bg1"/>
+        </a:solidFill>
+        <a:effectLst/>
+      </p:bgPr>
+    </p:bg>
+    <p:spTree>
+      <p:nvGrpSpPr>
+        <p:cNvPr id="1" name=""/>
+        <p:cNvGrpSpPr/>
+        <p:nvPr/>
+      </p:nvGrpSpPr>
+      <p:grpSpPr>
+        <a:xfrm>
+          <a:off x="0" y="0"/>
+          <a:ext cx="0" cy="0"/>
+          <a:chOff x="0" y="0"/>
+          <a:chExt cx="0" cy="0"/>
+        </a:xfrm>
+      </p:grpSpPr>
+      <p:sp useBgFill="1">
+        <p:nvSpPr>
+          <p:cNvPr id="8" name="Rectangle 7">
+            <a:extLst>
+              <a:ext uri="{FF2B5EF4-FFF2-40B4-BE49-F238E27FC236}">
+                <a16:creationId xmlns:a16="http://schemas.microsoft.com/office/drawing/2014/main" id="{3B854194-185D-494D-905C-7C7CB2E30F6E}"/>
+              </a:ext>
+              <a:ext uri="{C183D7F6-B498-43B3-948B-1728B52AA6E4}">
+                <adec:decorative xmlns:adec="http://schemas.microsoft.com/office/drawing/2017/decorative" val="1"/>
+              </a:ext>
+            </a:extLst>
+          </p:cNvPr>
+          <p:cNvSpPr>
+            <a:spLocks noGrp="1" noRot="1" noChangeAspect="1" noMove="1" noResize="1" noEditPoints="1" noAdjustHandles="1" noChangeArrowheads="1" noChangeShapeType="1" noTextEdit="1"/>
+          </p:cNvSpPr>
+          <p:nvPr>
+            <p:extLst>
+              <p:ext uri="{386F3935-93C4-4BCD-93E2-E3B085C9AB24}">
+                <p16:designElem xmlns:p16="http://schemas.microsoft.com/office/powerpoint/2015/main" val="1"/>
+              </p:ext>
+            </p:extLst>
+          </p:nvPr>
+        </p:nvSpPr>
+        <p:spPr>
+          <a:xfrm>
+            <a:off x="1" y="0"/>
+            <a:ext cx="6082110" cy="6858000"/>
+          </a:xfrm>
+          <a:prstGeom prst="rect">
+            <a:avLst/>
+          </a:prstGeom>
+          <a:ln>
+            <a:noFill/>
+          </a:ln>
+        </p:spPr>
+        <p:style>
+          <a:lnRef idx="2">
+            <a:schemeClr val="accent1">
+              <a:shade val="50000"/>
+            </a:schemeClr>
+          </a:lnRef>
+          <a:fillRef idx="1">
+            <a:schemeClr val="accent1"/>
+          </a:fillRef>
+          <a:effectRef idx="0">
+            <a:schemeClr val="accent1"/>
+          </a:effectRef>
+          <a:fontRef idx="minor">
+            <a:schemeClr val="lt1"/>
+          </a:fontRef>
+        </p:style>
+        <p:txBody>
+          <a:bodyPr rtlCol="0" anchor="ctr"/>
+          <a:lstStyle/>
+          <a:p>
+            <a:pPr algn="ctr"/>
+            <a:endParaRPr lang="en-US"/>
+          </a:p>
+        </p:txBody>
+      </p:sp>
+      <p:sp>
+        <p:nvSpPr>
+          <p:cNvPr id="10" name="Rectangle 9">
+            <a:extLst>
+              <a:ext uri="{FF2B5EF4-FFF2-40B4-BE49-F238E27FC236}">
+                <a16:creationId xmlns:a16="http://schemas.microsoft.com/office/drawing/2014/main" id="{B4F5FA0D-0104-4987-8241-EFF7C85B88DE}"/>
+              </a:ext>
+              <a:ext uri="{C183D7F6-B498-43B3-948B-1728B52AA6E4}">
+                <adec:decorative xmlns:adec="http://schemas.microsoft.com/office/drawing/2017/decorative" val="1"/>
+              </a:ext>
+            </a:extLst>
+          </p:cNvPr>
+          <p:cNvSpPr>
+            <a:spLocks noGrp="1" noRot="1" noChangeAspect="1" noMove="1" noResize="1" noEditPoints="1" noAdjustHandles="1" noChangeArrowheads="1" noChangeShapeType="1" noTextEdit="1"/>
+          </p:cNvSpPr>
+          <p:nvPr>
+            <p:extLst>
+              <p:ext uri="{386F3935-93C4-4BCD-93E2-E3B085C9AB24}">
+                <p16:designElem xmlns:p16="http://schemas.microsoft.com/office/powerpoint/2015/main" val="1"/>
+              </p:ext>
+            </p:extLst>
+          </p:nvPr>
+        </p:nvSpPr>
+        <p:spPr>
+          <a:xfrm>
+            <a:off x="1" y="0"/>
+            <a:ext cx="12191998" cy="6858000"/>
+          </a:xfrm>
+          <a:prstGeom prst="rect">
+            <a:avLst/>
+          </a:prstGeom>
+          <a:gradFill>
+            <a:gsLst>
+              <a:gs pos="0">
+                <a:schemeClr val="accent1">
+                  <a:lumMod val="90000"/>
+                </a:schemeClr>
+              </a:gs>
+              <a:gs pos="25000">
+                <a:schemeClr val="accent1">
+                  <a:lumMod val="90000"/>
+                </a:schemeClr>
+              </a:gs>
+              <a:gs pos="94000">
+                <a:schemeClr val="bg2">
+                  <a:lumMod val="25000"/>
+                </a:schemeClr>
+              </a:gs>
+              <a:gs pos="100000">
+                <a:schemeClr val="bg2">
+                  <a:lumMod val="25000"/>
+                </a:schemeClr>
+              </a:gs>
+            </a:gsLst>
+            <a:lin ang="4200000" scaled="0"/>
+          </a:gradFill>
+          <a:ln>
+            <a:noFill/>
+          </a:ln>
+        </p:spPr>
+        <p:style>
+          <a:lnRef idx="2">
+            <a:schemeClr val="accent1">
+              <a:shade val="50000"/>
+            </a:schemeClr>
+          </a:lnRef>
+          <a:fillRef idx="1">
+            <a:schemeClr val="accent1"/>
+          </a:fillRef>
+          <a:effectRef idx="0">
+            <a:schemeClr val="accent1"/>
+          </a:effectRef>
+          <a:fontRef idx="minor">
+            <a:schemeClr val="lt1"/>
+          </a:fontRef>
+        </p:style>
+        <p:txBody>
+          <a:bodyPr rtlCol="0" anchor="ctr"/>
+          <a:lstStyle/>
+          <a:p>
+            <a:pPr algn="ctr"/>
+            <a:endParaRPr lang="en-US"/>
+          </a:p>
+        </p:txBody>
+      </p:sp>
+      <p:pic>
+        <p:nvPicPr>
+          <p:cNvPr id="12" name="Picture 11">
+            <a:extLst>
+              <a:ext uri="{FF2B5EF4-FFF2-40B4-BE49-F238E27FC236}">
+                <a16:creationId xmlns:a16="http://schemas.microsoft.com/office/drawing/2014/main" id="{2897127E-6CEF-446C-BE87-93B7C46E49D1}"/>
+              </a:ext>
+              <a:ext uri="{C183D7F6-B498-43B3-948B-1728B52AA6E4}">
+                <adec:decorative xmlns:adec="http://schemas.microsoft.com/office/drawing/2017/decorative" val="1"/>
+              </a:ext>
+            </a:extLst>
+          </p:cNvPr>
+          <p:cNvPicPr>
+            <a:picLocks noGrp="1" noRot="1" noChangeAspect="1" noMove="1" noResize="1" noEditPoints="1" noAdjustHandles="1" noChangeArrowheads="1" noChangeShapeType="1" noCrop="1"/>
+          </p:cNvPicPr>
+          <p:nvPr>
+            <p:extLst>
+              <p:ext uri="{386F3935-93C4-4BCD-93E2-E3B085C9AB24}">
+                <p16:designElem xmlns:p16="http://schemas.microsoft.com/office/powerpoint/2015/main" val="1"/>
+              </p:ext>
+            </p:extLst>
+          </p:nvPr>
+        </p:nvPicPr>
+        <p:blipFill>
+          <a:blip r:embed="rId2">
+            <a:extLst>
+              <a:ext uri="{28A0092B-C50C-407E-A947-70E740481C1C}">
+                <a14:useLocalDpi xmlns:a14="http://schemas.microsoft.com/office/drawing/2010/main" val="0"/>
+              </a:ext>
+            </a:extLst>
+          </a:blip>
+          <a:stretch>
+            <a:fillRect/>
+          </a:stretch>
+        </p:blipFill>
+        <p:spPr>
+          <a:xfrm>
+            <a:off x="0" y="0"/>
+            <a:ext cx="12192000" cy="6858000"/>
+          </a:xfrm>
+          <a:prstGeom prst="rect">
+            <a:avLst/>
+          </a:prstGeom>
+        </p:spPr>
+      </p:pic>
+      <p:sp>
+        <p:nvSpPr>
+          <p:cNvPr id="2" name="Title 1">
+            <a:extLst>
+              <a:ext uri="{FF2B5EF4-FFF2-40B4-BE49-F238E27FC236}">
+                <a16:creationId xmlns:a16="http://schemas.microsoft.com/office/drawing/2014/main" id="{CCBEC4D0-FD31-460F-BC5D-F79847C0A7A8}"/>
+              </a:ext>
+            </a:extLst>
+          </p:cNvPr>
+          <p:cNvSpPr>
+            <a:spLocks noGrp="1"/>
+          </p:cNvSpPr>
+          <p:nvPr>
+            <p:ph type="title"/>
+          </p:nvPr>
+        </p:nvSpPr>
+        <p:spPr>
+          <a:xfrm>
+            <a:off x="640079" y="2053641"/>
+            <a:ext cx="3669161" cy="2760098"/>
+          </a:xfrm>
+        </p:spPr>
+        <p:txBody>
+          <a:bodyPr>
+            <a:normAutofit/>
+          </a:bodyPr>
+          <a:lstStyle/>
+          <a:p>
+            <a:r>
+              <a:rPr lang="en-US" dirty="0">
+                <a:solidFill>
+                  <a:srgbClr val="FFFFFF"/>
+                </a:solidFill>
+              </a:rPr>
+              <a:t>Statistics Fun </a:t>
+            </a:r>
+          </a:p>
+        </p:txBody>
+      </p:sp>
+      <p:sp>
+        <p:nvSpPr>
+          <p:cNvPr id="3" name="Content Placeholder 2">
+            <a:extLst>
+              <a:ext uri="{FF2B5EF4-FFF2-40B4-BE49-F238E27FC236}">
+                <a16:creationId xmlns:a16="http://schemas.microsoft.com/office/drawing/2014/main" id="{39AE9D0B-2B69-40B7-8CE4-79C915F64B8E}"/>
+              </a:ext>
+            </a:extLst>
+          </p:cNvPr>
+          <p:cNvSpPr>
+            <a:spLocks noGrp="1"/>
+          </p:cNvSpPr>
+          <p:nvPr>
+            <p:ph idx="1"/>
+          </p:nvPr>
+        </p:nvSpPr>
+        <p:spPr>
+          <a:xfrm>
+            <a:off x="6090574" y="801866"/>
+            <a:ext cx="5306084" cy="5230634"/>
+          </a:xfrm>
+        </p:spPr>
+        <p:txBody>
+          <a:bodyPr anchor="ctr">
+            <a:normAutofit fontScale="92500" lnSpcReduction="10000"/>
+          </a:bodyPr>
+          <a:lstStyle/>
+          <a:p>
+            <a:endParaRPr lang="en-US" sz="2400" dirty="0">
+              <a:solidFill>
+                <a:srgbClr val="000000"/>
+              </a:solidFill>
+            </a:endParaRPr>
+          </a:p>
+          <a:p>
             <a:r>
               <a:rPr lang="en-US" sz="2400" dirty="0">
                 <a:solidFill>
                   <a:srgbClr val="000000"/>
                 </a:solidFill>
               </a:rPr>
-              <a:t>Our hypothesis predicts that there is a correlation between crime and time of year.  Crime rates will fluctuate between day of the week, season, and lunar cycle. </a:t>
+              <a:t>Pearson correlation coefficient measures the linear relationship between two datasets.  </a:t>
+            </a:r>
+          </a:p>
+          <a:p>
+            <a:r>
+              <a:rPr lang="en-US" sz="2400" dirty="0">
+                <a:solidFill>
+                  <a:srgbClr val="000000"/>
+                </a:solidFill>
+              </a:rPr>
+              <a:t>It requires that each dataset be normally distributed.  AWESOME! </a:t>
+            </a:r>
+          </a:p>
+          <a:p>
+            <a:r>
+              <a:rPr lang="en-US" sz="2400" dirty="0">
+                <a:solidFill>
+                  <a:srgbClr val="000000"/>
+                </a:solidFill>
+              </a:rPr>
+              <a:t>Pearson correlation varies between -1 and +0 with 0 implying no correlation.</a:t>
+            </a:r>
+          </a:p>
+          <a:p>
+            <a:r>
+              <a:rPr lang="en-US" sz="2400" dirty="0">
+                <a:solidFill>
+                  <a:srgbClr val="000000"/>
+                </a:solidFill>
+              </a:rPr>
+              <a:t>Correlations of -1 or +1 imply an exact linear relationship.  </a:t>
+            </a:r>
+          </a:p>
+          <a:p>
+            <a:pPr lvl="1"/>
+            <a:r>
+              <a:rPr lang="en-US" sz="2000" dirty="0">
+                <a:solidFill>
+                  <a:srgbClr val="000000"/>
+                </a:solidFill>
+              </a:rPr>
+              <a:t>Positive correlations imply that as x increases, so does y.</a:t>
+            </a:r>
+          </a:p>
+          <a:p>
+            <a:pPr lvl="1"/>
+            <a:r>
+              <a:rPr lang="en-US" sz="2000" dirty="0">
+                <a:solidFill>
+                  <a:srgbClr val="000000"/>
+                </a:solidFill>
+              </a:rPr>
+              <a:t>Negative correlations imply that as x increases, y decreases.</a:t>
+            </a:r>
+          </a:p>
+          <a:p>
+            <a:r>
+              <a:rPr lang="en-US" sz="2400" dirty="0">
+                <a:solidFill>
+                  <a:srgbClr val="000000"/>
+                </a:solidFill>
+              </a:rPr>
+              <a:t>How do I know if my data is normally distributed?</a:t>
             </a:r>
           </a:p>
         </p:txBody>
@@ -6855,7 +8040,7 @@
     </p:spTree>
     <p:extLst>
       <p:ext uri="{BB962C8B-B14F-4D97-AF65-F5344CB8AC3E}">
-        <p14:creationId xmlns:p14="http://schemas.microsoft.com/office/powerpoint/2010/main" val="1314926321"/>
+        <p14:creationId xmlns:p14="http://schemas.microsoft.com/office/powerpoint/2010/main" val="3528731629"/>
       </p:ext>
     </p:extLst>
   </p:cSld>
@@ -8398,6 +9583,932 @@
     <p:extLst>
       <p:ext uri="{BB962C8B-B14F-4D97-AF65-F5344CB8AC3E}">
         <p14:creationId xmlns:p14="http://schemas.microsoft.com/office/powerpoint/2010/main" val="1672891680"/>
+      </p:ext>
+    </p:extLst>
+  </p:cSld>
+  <p:clrMapOvr>
+    <a:masterClrMapping/>
+  </p:clrMapOvr>
+</p:sld>
+</file>
+
+<file path=ppt/slides/slide7.xml><?xml version="1.0" encoding="utf-8"?>
+<p:sld xmlns:a="http://schemas.openxmlformats.org/drawingml/2006/main" xmlns:r="http://schemas.openxmlformats.org/officeDocument/2006/relationships" xmlns:p="http://schemas.openxmlformats.org/presentationml/2006/main">
+  <p:cSld>
+    <p:bg>
+      <p:bgPr>
+        <a:solidFill>
+          <a:schemeClr val="tx1">
+            <a:lumMod val="85000"/>
+            <a:lumOff val="15000"/>
+          </a:schemeClr>
+        </a:solidFill>
+        <a:effectLst/>
+      </p:bgPr>
+    </p:bg>
+    <p:spTree>
+      <p:nvGrpSpPr>
+        <p:cNvPr id="1" name=""/>
+        <p:cNvGrpSpPr/>
+        <p:nvPr/>
+      </p:nvGrpSpPr>
+      <p:grpSpPr>
+        <a:xfrm>
+          <a:off x="0" y="0"/>
+          <a:ext cx="0" cy="0"/>
+          <a:chOff x="0" y="0"/>
+          <a:chExt cx="0" cy="0"/>
+        </a:xfrm>
+      </p:grpSpPr>
+      <p:pic>
+        <p:nvPicPr>
+          <p:cNvPr id="13" name="Content Placeholder 12">
+            <a:extLst>
+              <a:ext uri="{FF2B5EF4-FFF2-40B4-BE49-F238E27FC236}">
+                <a16:creationId xmlns:a16="http://schemas.microsoft.com/office/drawing/2014/main" id="{7D12C600-5940-429A-AE47-B6AB3988EBDB}"/>
+              </a:ext>
+            </a:extLst>
+          </p:cNvPr>
+          <p:cNvPicPr>
+            <a:picLocks noGrp="1" noChangeAspect="1"/>
+          </p:cNvPicPr>
+          <p:nvPr>
+            <p:ph idx="1"/>
+          </p:nvPr>
+        </p:nvPicPr>
+        <p:blipFill>
+          <a:blip r:embed="rId2"/>
+          <a:stretch>
+            <a:fillRect/>
+          </a:stretch>
+        </p:blipFill>
+        <p:spPr>
+          <a:xfrm>
+            <a:off x="103632" y="66675"/>
+            <a:ext cx="11430000" cy="6419850"/>
+          </a:xfrm>
+          <a:prstGeom prst="rect">
+            <a:avLst/>
+          </a:prstGeom>
+        </p:spPr>
+      </p:pic>
+      <p:sp>
+        <p:nvSpPr>
+          <p:cNvPr id="14" name="Rectangle 7">
+            <a:extLst>
+              <a:ext uri="{FF2B5EF4-FFF2-40B4-BE49-F238E27FC236}">
+                <a16:creationId xmlns:a16="http://schemas.microsoft.com/office/drawing/2014/main" id="{8D70B121-56F4-4848-B38B-182089D909FA}"/>
+              </a:ext>
+              <a:ext uri="{C183D7F6-B498-43B3-948B-1728B52AA6E4}">
+                <adec:decorative xmlns:adec="http://schemas.microsoft.com/office/drawing/2017/decorative" val="1"/>
+              </a:ext>
+            </a:extLst>
+          </p:cNvPr>
+          <p:cNvSpPr>
+            <a:spLocks noGrp="1" noRot="1" noChangeAspect="1" noMove="1" noResize="1" noEditPoints="1" noAdjustHandles="1" noChangeArrowheads="1" noChangeShapeType="1" noTextEdit="1"/>
+          </p:cNvSpPr>
+          <p:nvPr>
+            <p:extLst>
+              <p:ext uri="{386F3935-93C4-4BCD-93E2-E3B085C9AB24}">
+                <p16:designElem xmlns:p16="http://schemas.microsoft.com/office/powerpoint/2015/main" val="1"/>
+              </p:ext>
+            </p:extLst>
+          </p:nvPr>
+        </p:nvSpPr>
+        <p:spPr bwMode="ltGray">
+          <a:xfrm>
+            <a:off x="321564" y="320040"/>
+            <a:ext cx="11548872" cy="6217920"/>
+          </a:xfrm>
+          <a:prstGeom prst="rect">
+            <a:avLst/>
+          </a:prstGeom>
+          <a:solidFill>
+            <a:schemeClr val="tx1">
+              <a:alpha val="8000"/>
+            </a:schemeClr>
+          </a:solidFill>
+          <a:ln w="127000" cap="sq" cmpd="thinThick">
+            <a:noFill/>
+          </a:ln>
+        </p:spPr>
+        <p:style>
+          <a:lnRef idx="2">
+            <a:schemeClr val="accent1">
+              <a:shade val="50000"/>
+            </a:schemeClr>
+          </a:lnRef>
+          <a:fillRef idx="1">
+            <a:schemeClr val="accent1"/>
+          </a:fillRef>
+          <a:effectRef idx="0">
+            <a:schemeClr val="accent1"/>
+          </a:effectRef>
+          <a:fontRef idx="minor">
+            <a:schemeClr val="lt1"/>
+          </a:fontRef>
+        </p:style>
+        <p:txBody>
+          <a:bodyPr rtlCol="0" anchor="ctr"/>
+          <a:lstStyle/>
+          <a:p>
+            <a:pPr algn="ctr"/>
+            <a:endParaRPr lang="en-US"/>
+          </a:p>
+        </p:txBody>
+      </p:sp>
+      <p:cxnSp>
+        <p:nvCxnSpPr>
+          <p:cNvPr id="15" name="Straight Connector 9">
+            <a:extLst>
+              <a:ext uri="{FF2B5EF4-FFF2-40B4-BE49-F238E27FC236}">
+                <a16:creationId xmlns:a16="http://schemas.microsoft.com/office/drawing/2014/main" id="{2D72A2C9-F3CA-4216-8BAD-FA4C970C3C4E}"/>
+              </a:ext>
+              <a:ext uri="{C183D7F6-B498-43B3-948B-1728B52AA6E4}">
+                <adec:decorative xmlns:adec="http://schemas.microsoft.com/office/drawing/2017/decorative" val="1"/>
+              </a:ext>
+            </a:extLst>
+          </p:cNvPr>
+          <p:cNvCxnSpPr>
+            <a:cxnSpLocks noGrp="1" noRot="1" noChangeAspect="1" noMove="1" noResize="1" noEditPoints="1" noAdjustHandles="1" noChangeArrowheads="1" noChangeShapeType="1"/>
+          </p:cNvCxnSpPr>
+          <p:nvPr>
+            <p:extLst>
+              <p:ext uri="{386F3935-93C4-4BCD-93E2-E3B085C9AB24}">
+                <p16:designElem xmlns:p16="http://schemas.microsoft.com/office/powerpoint/2015/main" val="1"/>
+              </p:ext>
+            </p:extLst>
+          </p:nvPr>
+        </p:nvCxnSpPr>
+        <p:spPr>
+          <a:xfrm>
+            <a:off x="4654296" y="2057400"/>
+            <a:ext cx="0" cy="2743200"/>
+          </a:xfrm>
+          <a:prstGeom prst="line">
+            <a:avLst/>
+          </a:prstGeom>
+          <a:ln w="19050">
+            <a:solidFill>
+              <a:schemeClr val="tx1">
+                <a:lumMod val="85000"/>
+                <a:lumOff val="15000"/>
+              </a:schemeClr>
+            </a:solidFill>
+          </a:ln>
+        </p:spPr>
+        <p:style>
+          <a:lnRef idx="1">
+            <a:schemeClr val="accent1"/>
+          </a:lnRef>
+          <a:fillRef idx="0">
+            <a:schemeClr val="accent1"/>
+          </a:fillRef>
+          <a:effectRef idx="0">
+            <a:schemeClr val="accent1"/>
+          </a:effectRef>
+          <a:fontRef idx="minor">
+            <a:schemeClr val="tx1"/>
+          </a:fontRef>
+        </p:style>
+      </p:cxnSp>
+      <p:sp>
+        <p:nvSpPr>
+          <p:cNvPr id="4" name="AutoShape 2" descr="Image result for dark side of the moon">
+            <a:extLst>
+              <a:ext uri="{FF2B5EF4-FFF2-40B4-BE49-F238E27FC236}">
+                <a16:creationId xmlns:a16="http://schemas.microsoft.com/office/drawing/2014/main" id="{6CD22A2B-A41D-48DF-B82F-7BC24EFB3944}"/>
+              </a:ext>
+            </a:extLst>
+          </p:cNvPr>
+          <p:cNvSpPr>
+            <a:spLocks noChangeAspect="1" noChangeArrowheads="1"/>
+          </p:cNvSpPr>
+          <p:nvPr/>
+        </p:nvSpPr>
+        <p:spPr bwMode="auto">
+          <a:xfrm>
+            <a:off x="5943600" y="3276600"/>
+            <a:ext cx="304800" cy="304800"/>
+          </a:xfrm>
+          <a:prstGeom prst="rect">
+            <a:avLst/>
+          </a:prstGeom>
+          <a:noFill/>
+          <a:extLst>
+            <a:ext uri="{909E8E84-426E-40DD-AFC4-6F175D3DCCD1}">
+              <a14:hiddenFill xmlns:a14="http://schemas.microsoft.com/office/drawing/2010/main">
+                <a:solidFill>
+                  <a:srgbClr val="FFFFFF"/>
+                </a:solidFill>
+              </a14:hiddenFill>
+            </a:ext>
+          </a:extLst>
+        </p:spPr>
+        <p:txBody>
+          <a:bodyPr vert="horz" wrap="square" lIns="91440" tIns="45720" rIns="91440" bIns="45720" numCol="1" anchor="t" anchorCtr="0" compatLnSpc="1">
+            <a:prstTxWarp prst="textNoShape">
+              <a:avLst/>
+            </a:prstTxWarp>
+          </a:bodyPr>
+          <a:lstStyle/>
+          <a:p>
+            <a:endParaRPr lang="en-US"/>
+          </a:p>
+        </p:txBody>
+      </p:sp>
+    </p:spTree>
+    <p:extLst>
+      <p:ext uri="{BB962C8B-B14F-4D97-AF65-F5344CB8AC3E}">
+        <p14:creationId xmlns:p14="http://schemas.microsoft.com/office/powerpoint/2010/main" val="3849223126"/>
+      </p:ext>
+    </p:extLst>
+  </p:cSld>
+  <p:clrMapOvr>
+    <a:masterClrMapping/>
+  </p:clrMapOvr>
+</p:sld>
+</file>
+
+<file path=ppt/slides/slide8.xml><?xml version="1.0" encoding="utf-8"?>
+<p:sld xmlns:a="http://schemas.openxmlformats.org/drawingml/2006/main" xmlns:r="http://schemas.openxmlformats.org/officeDocument/2006/relationships" xmlns:p="http://schemas.openxmlformats.org/presentationml/2006/main">
+  <p:cSld>
+    <p:bg>
+      <p:bgPr>
+        <a:solidFill>
+          <a:schemeClr val="tx1">
+            <a:lumMod val="85000"/>
+            <a:lumOff val="15000"/>
+          </a:schemeClr>
+        </a:solidFill>
+        <a:effectLst/>
+      </p:bgPr>
+    </p:bg>
+    <p:spTree>
+      <p:nvGrpSpPr>
+        <p:cNvPr id="1" name=""/>
+        <p:cNvGrpSpPr/>
+        <p:nvPr/>
+      </p:nvGrpSpPr>
+      <p:grpSpPr>
+        <a:xfrm>
+          <a:off x="0" y="0"/>
+          <a:ext cx="0" cy="0"/>
+          <a:chOff x="0" y="0"/>
+          <a:chExt cx="0" cy="0"/>
+        </a:xfrm>
+      </p:grpSpPr>
+      <p:sp>
+        <p:nvSpPr>
+          <p:cNvPr id="14" name="Rectangle 7">
+            <a:extLst>
+              <a:ext uri="{FF2B5EF4-FFF2-40B4-BE49-F238E27FC236}">
+                <a16:creationId xmlns:a16="http://schemas.microsoft.com/office/drawing/2014/main" id="{8D70B121-56F4-4848-B38B-182089D909FA}"/>
+              </a:ext>
+              <a:ext uri="{C183D7F6-B498-43B3-948B-1728B52AA6E4}">
+                <adec:decorative xmlns:adec="http://schemas.microsoft.com/office/drawing/2017/decorative" val="1"/>
+              </a:ext>
+            </a:extLst>
+          </p:cNvPr>
+          <p:cNvSpPr>
+            <a:spLocks noGrp="1" noRot="1" noChangeAspect="1" noMove="1" noResize="1" noEditPoints="1" noAdjustHandles="1" noChangeArrowheads="1" noChangeShapeType="1" noTextEdit="1"/>
+          </p:cNvSpPr>
+          <p:nvPr>
+            <p:extLst>
+              <p:ext uri="{386F3935-93C4-4BCD-93E2-E3B085C9AB24}">
+                <p16:designElem xmlns:p16="http://schemas.microsoft.com/office/powerpoint/2015/main" val="1"/>
+              </p:ext>
+            </p:extLst>
+          </p:nvPr>
+        </p:nvSpPr>
+        <p:spPr bwMode="ltGray">
+          <a:xfrm>
+            <a:off x="321564" y="320040"/>
+            <a:ext cx="11548872" cy="6217920"/>
+          </a:xfrm>
+          <a:prstGeom prst="rect">
+            <a:avLst/>
+          </a:prstGeom>
+          <a:solidFill>
+            <a:schemeClr val="tx1">
+              <a:alpha val="8000"/>
+            </a:schemeClr>
+          </a:solidFill>
+          <a:ln w="127000" cap="sq" cmpd="thinThick">
+            <a:noFill/>
+          </a:ln>
+        </p:spPr>
+        <p:style>
+          <a:lnRef idx="2">
+            <a:schemeClr val="accent1">
+              <a:shade val="50000"/>
+            </a:schemeClr>
+          </a:lnRef>
+          <a:fillRef idx="1">
+            <a:schemeClr val="accent1"/>
+          </a:fillRef>
+          <a:effectRef idx="0">
+            <a:schemeClr val="accent1"/>
+          </a:effectRef>
+          <a:fontRef idx="minor">
+            <a:schemeClr val="lt1"/>
+          </a:fontRef>
+        </p:style>
+        <p:txBody>
+          <a:bodyPr rtlCol="0" anchor="ctr"/>
+          <a:lstStyle/>
+          <a:p>
+            <a:pPr algn="ctr"/>
+            <a:endParaRPr lang="en-US"/>
+          </a:p>
+        </p:txBody>
+      </p:sp>
+      <p:sp>
+        <p:nvSpPr>
+          <p:cNvPr id="2" name="Title 1">
+            <a:extLst>
+              <a:ext uri="{FF2B5EF4-FFF2-40B4-BE49-F238E27FC236}">
+                <a16:creationId xmlns:a16="http://schemas.microsoft.com/office/drawing/2014/main" id="{CCBEC4D0-FD31-460F-BC5D-F79847C0A7A8}"/>
+              </a:ext>
+            </a:extLst>
+          </p:cNvPr>
+          <p:cNvSpPr>
+            <a:spLocks noGrp="1"/>
+          </p:cNvSpPr>
+          <p:nvPr>
+            <p:ph type="title"/>
+          </p:nvPr>
+        </p:nvSpPr>
+        <p:spPr>
+          <a:xfrm>
+            <a:off x="838200" y="123007"/>
+            <a:ext cx="11032230" cy="1703150"/>
+          </a:xfrm>
+        </p:spPr>
+        <p:txBody>
+          <a:bodyPr>
+            <a:normAutofit/>
+          </a:bodyPr>
+          <a:lstStyle/>
+          <a:p>
+            <a:r>
+              <a:rPr lang="en-US" sz="2000" b="1" dirty="0">
+                <a:solidFill>
+                  <a:schemeClr val="bg1"/>
+                </a:solidFill>
+              </a:rPr>
+              <a:t>New Moon </a:t>
+            </a:r>
+            <a:r>
+              <a:rPr lang="en-US" sz="2000" dirty="0">
+                <a:solidFill>
+                  <a:schemeClr val="bg1"/>
+                </a:solidFill>
+              </a:rPr>
+              <a:t>is the 1</a:t>
+            </a:r>
+            <a:r>
+              <a:rPr lang="en-US" sz="2000" baseline="30000" dirty="0">
+                <a:solidFill>
+                  <a:schemeClr val="bg1"/>
+                </a:solidFill>
+              </a:rPr>
+              <a:t>st</a:t>
+            </a:r>
+            <a:r>
+              <a:rPr lang="en-US" sz="2000" dirty="0">
+                <a:solidFill>
+                  <a:schemeClr val="bg1"/>
+                </a:solidFill>
+              </a:rPr>
+              <a:t> primary phase of the moon and it occurs when the Sun and Moon are aligned, with the Sun and Earth on opposite sides of the Moon.  A New Moon cannot normally be seen from Earth since only the dark side of the Moon faces our planet at this time.</a:t>
+            </a:r>
+          </a:p>
+        </p:txBody>
+      </p:sp>
+      <p:cxnSp>
+        <p:nvCxnSpPr>
+          <p:cNvPr id="15" name="Straight Connector 9">
+            <a:extLst>
+              <a:ext uri="{FF2B5EF4-FFF2-40B4-BE49-F238E27FC236}">
+                <a16:creationId xmlns:a16="http://schemas.microsoft.com/office/drawing/2014/main" id="{2D72A2C9-F3CA-4216-8BAD-FA4C970C3C4E}"/>
+              </a:ext>
+              <a:ext uri="{C183D7F6-B498-43B3-948B-1728B52AA6E4}">
+                <adec:decorative xmlns:adec="http://schemas.microsoft.com/office/drawing/2017/decorative" val="1"/>
+              </a:ext>
+            </a:extLst>
+          </p:cNvPr>
+          <p:cNvCxnSpPr>
+            <a:cxnSpLocks noGrp="1" noRot="1" noChangeAspect="1" noMove="1" noResize="1" noEditPoints="1" noAdjustHandles="1" noChangeArrowheads="1" noChangeShapeType="1"/>
+          </p:cNvCxnSpPr>
+          <p:nvPr>
+            <p:extLst>
+              <p:ext uri="{386F3935-93C4-4BCD-93E2-E3B085C9AB24}">
+                <p16:designElem xmlns:p16="http://schemas.microsoft.com/office/powerpoint/2015/main" val="1"/>
+              </p:ext>
+            </p:extLst>
+          </p:nvPr>
+        </p:nvCxnSpPr>
+        <p:spPr>
+          <a:xfrm>
+            <a:off x="4654296" y="2057400"/>
+            <a:ext cx="0" cy="2743200"/>
+          </a:xfrm>
+          <a:prstGeom prst="line">
+            <a:avLst/>
+          </a:prstGeom>
+          <a:ln w="19050">
+            <a:solidFill>
+              <a:schemeClr val="tx1">
+                <a:lumMod val="85000"/>
+                <a:lumOff val="15000"/>
+              </a:schemeClr>
+            </a:solidFill>
+          </a:ln>
+        </p:spPr>
+        <p:style>
+          <a:lnRef idx="1">
+            <a:schemeClr val="accent1"/>
+          </a:lnRef>
+          <a:fillRef idx="0">
+            <a:schemeClr val="accent1"/>
+          </a:fillRef>
+          <a:effectRef idx="0">
+            <a:schemeClr val="accent1"/>
+          </a:effectRef>
+          <a:fontRef idx="minor">
+            <a:schemeClr val="tx1"/>
+          </a:fontRef>
+        </p:style>
+      </p:cxnSp>
+      <p:pic>
+        <p:nvPicPr>
+          <p:cNvPr id="9" name="Content Placeholder 8" descr="Illustration of the Moon's position in space in relation to Earth and the Sun at New Moon.">
+            <a:extLst>
+              <a:ext uri="{FF2B5EF4-FFF2-40B4-BE49-F238E27FC236}">
+                <a16:creationId xmlns:a16="http://schemas.microsoft.com/office/drawing/2014/main" id="{DDA872B1-2D96-4F56-A14B-3DCC863F00B9}"/>
+              </a:ext>
+            </a:extLst>
+          </p:cNvPr>
+          <p:cNvPicPr>
+            <a:picLocks noGrp="1" noChangeAspect="1" noChangeArrowheads="1"/>
+          </p:cNvPicPr>
+          <p:nvPr>
+            <p:ph idx="1"/>
+          </p:nvPr>
+        </p:nvPicPr>
+        <p:blipFill>
+          <a:blip r:embed="rId2">
+            <a:extLst>
+              <a:ext uri="{28A0092B-C50C-407E-A947-70E740481C1C}">
+                <a14:useLocalDpi xmlns:a14="http://schemas.microsoft.com/office/drawing/2010/main" val="0"/>
+              </a:ext>
+            </a:extLst>
+          </a:blip>
+          <a:srcRect/>
+          <a:stretch>
+            <a:fillRect/>
+          </a:stretch>
+        </p:blipFill>
+        <p:spPr bwMode="auto">
+          <a:xfrm>
+            <a:off x="692615" y="1594913"/>
+            <a:ext cx="6886179" cy="4590785"/>
+          </a:xfrm>
+          <a:prstGeom prst="rect">
+            <a:avLst/>
+          </a:prstGeom>
+          <a:noFill/>
+          <a:extLst>
+            <a:ext uri="{909E8E84-426E-40DD-AFC4-6F175D3DCCD1}">
+              <a14:hiddenFill xmlns:a14="http://schemas.microsoft.com/office/drawing/2010/main">
+                <a:solidFill>
+                  <a:srgbClr val="FFFFFF"/>
+                </a:solidFill>
+              </a14:hiddenFill>
+            </a:ext>
+          </a:extLst>
+        </p:spPr>
+      </p:pic>
+      <p:sp>
+        <p:nvSpPr>
+          <p:cNvPr id="4" name="AutoShape 2" descr="Image result for dark side of the moon">
+            <a:extLst>
+              <a:ext uri="{FF2B5EF4-FFF2-40B4-BE49-F238E27FC236}">
+                <a16:creationId xmlns:a16="http://schemas.microsoft.com/office/drawing/2014/main" id="{6CD22A2B-A41D-48DF-B82F-7BC24EFB3944}"/>
+              </a:ext>
+            </a:extLst>
+          </p:cNvPr>
+          <p:cNvSpPr>
+            <a:spLocks noChangeAspect="1" noChangeArrowheads="1"/>
+          </p:cNvSpPr>
+          <p:nvPr/>
+        </p:nvSpPr>
+        <p:spPr bwMode="auto">
+          <a:xfrm>
+            <a:off x="5943600" y="3276600"/>
+            <a:ext cx="304800" cy="304800"/>
+          </a:xfrm>
+          <a:prstGeom prst="rect">
+            <a:avLst/>
+          </a:prstGeom>
+          <a:noFill/>
+          <a:extLst>
+            <a:ext uri="{909E8E84-426E-40DD-AFC4-6F175D3DCCD1}">
+              <a14:hiddenFill xmlns:a14="http://schemas.microsoft.com/office/drawing/2010/main">
+                <a:solidFill>
+                  <a:srgbClr val="FFFFFF"/>
+                </a:solidFill>
+              </a14:hiddenFill>
+            </a:ext>
+          </a:extLst>
+        </p:spPr>
+        <p:txBody>
+          <a:bodyPr vert="horz" wrap="square" lIns="91440" tIns="45720" rIns="91440" bIns="45720" numCol="1" anchor="t" anchorCtr="0" compatLnSpc="1">
+            <a:prstTxWarp prst="textNoShape">
+              <a:avLst/>
+            </a:prstTxWarp>
+          </a:bodyPr>
+          <a:lstStyle/>
+          <a:p>
+            <a:endParaRPr lang="en-US"/>
+          </a:p>
+        </p:txBody>
+      </p:sp>
+      <p:pic>
+        <p:nvPicPr>
+          <p:cNvPr id="11" name="Content Placeholder 8">
+            <a:extLst>
+              <a:ext uri="{FF2B5EF4-FFF2-40B4-BE49-F238E27FC236}">
+                <a16:creationId xmlns:a16="http://schemas.microsoft.com/office/drawing/2014/main" id="{6DECA978-7251-46E8-9A9F-3550A58C3FB5}"/>
+              </a:ext>
+            </a:extLst>
+          </p:cNvPr>
+          <p:cNvPicPr>
+            <a:picLocks noChangeAspect="1"/>
+          </p:cNvPicPr>
+          <p:nvPr/>
+        </p:nvPicPr>
+        <p:blipFill>
+          <a:blip r:embed="rId3"/>
+          <a:stretch>
+            <a:fillRect/>
+          </a:stretch>
+        </p:blipFill>
+        <p:spPr>
+          <a:xfrm>
+            <a:off x="11315700" y="5949019"/>
+            <a:ext cx="554730" cy="554730"/>
+          </a:xfrm>
+          <a:prstGeom prst="rect">
+            <a:avLst/>
+          </a:prstGeom>
+        </p:spPr>
+      </p:pic>
+    </p:spTree>
+    <p:extLst>
+      <p:ext uri="{BB962C8B-B14F-4D97-AF65-F5344CB8AC3E}">
+        <p14:creationId xmlns:p14="http://schemas.microsoft.com/office/powerpoint/2010/main" val="266456891"/>
+      </p:ext>
+    </p:extLst>
+  </p:cSld>
+  <p:clrMapOvr>
+    <a:masterClrMapping/>
+  </p:clrMapOvr>
+</p:sld>
+</file>
+
+<file path=ppt/slides/slide9.xml><?xml version="1.0" encoding="utf-8"?>
+<p:sld xmlns:a="http://schemas.openxmlformats.org/drawingml/2006/main" xmlns:r="http://schemas.openxmlformats.org/officeDocument/2006/relationships" xmlns:p="http://schemas.openxmlformats.org/presentationml/2006/main">
+  <p:cSld>
+    <p:bg>
+      <p:bgPr>
+        <a:gradFill>
+          <a:gsLst>
+            <a:gs pos="43000">
+              <a:schemeClr val="tx1">
+                <a:lumMod val="75000"/>
+                <a:lumOff val="25000"/>
+              </a:schemeClr>
+            </a:gs>
+            <a:gs pos="74000">
+              <a:schemeClr val="accent1">
+                <a:lumMod val="45000"/>
+                <a:lumOff val="55000"/>
+              </a:schemeClr>
+            </a:gs>
+            <a:gs pos="83000">
+              <a:schemeClr val="accent1">
+                <a:lumMod val="45000"/>
+                <a:lumOff val="55000"/>
+              </a:schemeClr>
+            </a:gs>
+            <a:gs pos="100000">
+              <a:schemeClr val="accent1">
+                <a:lumMod val="30000"/>
+                <a:lumOff val="70000"/>
+              </a:schemeClr>
+            </a:gs>
+          </a:gsLst>
+          <a:lin ang="13200000" scaled="0"/>
+        </a:gradFill>
+        <a:effectLst/>
+      </p:bgPr>
+    </p:bg>
+    <p:spTree>
+      <p:nvGrpSpPr>
+        <p:cNvPr id="1" name=""/>
+        <p:cNvGrpSpPr/>
+        <p:nvPr/>
+      </p:nvGrpSpPr>
+      <p:grpSpPr>
+        <a:xfrm>
+          <a:off x="0" y="0"/>
+          <a:ext cx="0" cy="0"/>
+          <a:chOff x="0" y="0"/>
+          <a:chExt cx="0" cy="0"/>
+        </a:xfrm>
+      </p:grpSpPr>
+      <p:sp>
+        <p:nvSpPr>
+          <p:cNvPr id="14" name="Rectangle 7">
+            <a:extLst>
+              <a:ext uri="{FF2B5EF4-FFF2-40B4-BE49-F238E27FC236}">
+                <a16:creationId xmlns:a16="http://schemas.microsoft.com/office/drawing/2014/main" id="{8D70B121-56F4-4848-B38B-182089D909FA}"/>
+              </a:ext>
+              <a:ext uri="{C183D7F6-B498-43B3-948B-1728B52AA6E4}">
+                <adec:decorative xmlns:adec="http://schemas.microsoft.com/office/drawing/2017/decorative" val="1"/>
+              </a:ext>
+            </a:extLst>
+          </p:cNvPr>
+          <p:cNvSpPr>
+            <a:spLocks noGrp="1" noRot="1" noChangeAspect="1" noMove="1" noResize="1" noEditPoints="1" noAdjustHandles="1" noChangeArrowheads="1" noChangeShapeType="1" noTextEdit="1"/>
+          </p:cNvSpPr>
+          <p:nvPr>
+            <p:extLst>
+              <p:ext uri="{386F3935-93C4-4BCD-93E2-E3B085C9AB24}">
+                <p16:designElem xmlns:p16="http://schemas.microsoft.com/office/powerpoint/2015/main" val="1"/>
+              </p:ext>
+            </p:extLst>
+          </p:nvPr>
+        </p:nvSpPr>
+        <p:spPr bwMode="ltGray">
+          <a:xfrm>
+            <a:off x="321564" y="320040"/>
+            <a:ext cx="11548872" cy="6217920"/>
+          </a:xfrm>
+          <a:prstGeom prst="rect">
+            <a:avLst/>
+          </a:prstGeom>
+          <a:solidFill>
+            <a:schemeClr val="tx1">
+              <a:alpha val="8000"/>
+            </a:schemeClr>
+          </a:solidFill>
+          <a:ln w="127000" cap="sq" cmpd="thinThick">
+            <a:noFill/>
+          </a:ln>
+        </p:spPr>
+        <p:style>
+          <a:lnRef idx="2">
+            <a:schemeClr val="accent1">
+              <a:shade val="50000"/>
+            </a:schemeClr>
+          </a:lnRef>
+          <a:fillRef idx="1">
+            <a:schemeClr val="accent1"/>
+          </a:fillRef>
+          <a:effectRef idx="0">
+            <a:schemeClr val="accent1"/>
+          </a:effectRef>
+          <a:fontRef idx="minor">
+            <a:schemeClr val="lt1"/>
+          </a:fontRef>
+        </p:style>
+        <p:txBody>
+          <a:bodyPr rtlCol="0" anchor="ctr"/>
+          <a:lstStyle/>
+          <a:p>
+            <a:pPr algn="ctr"/>
+            <a:endParaRPr lang="en-US"/>
+          </a:p>
+        </p:txBody>
+      </p:sp>
+      <p:sp>
+        <p:nvSpPr>
+          <p:cNvPr id="2" name="Title 1">
+            <a:extLst>
+              <a:ext uri="{FF2B5EF4-FFF2-40B4-BE49-F238E27FC236}">
+                <a16:creationId xmlns:a16="http://schemas.microsoft.com/office/drawing/2014/main" id="{CCBEC4D0-FD31-460F-BC5D-F79847C0A7A8}"/>
+              </a:ext>
+            </a:extLst>
+          </p:cNvPr>
+          <p:cNvSpPr>
+            <a:spLocks noGrp="1"/>
+          </p:cNvSpPr>
+          <p:nvPr>
+            <p:ph type="title"/>
+          </p:nvPr>
+        </p:nvSpPr>
+        <p:spPr>
+          <a:xfrm>
+            <a:off x="838200" y="123007"/>
+            <a:ext cx="11032230" cy="1703150"/>
+          </a:xfrm>
+        </p:spPr>
+        <p:txBody>
+          <a:bodyPr>
+            <a:normAutofit/>
+          </a:bodyPr>
+          <a:lstStyle/>
+          <a:p>
+            <a:r>
+              <a:rPr lang="en-US" sz="2000" b="1" dirty="0">
+                <a:solidFill>
+                  <a:schemeClr val="bg1"/>
+                </a:solidFill>
+              </a:rPr>
+              <a:t>First Quarter Moon </a:t>
+            </a:r>
+            <a:r>
+              <a:rPr lang="en-US" sz="2000" dirty="0">
+                <a:solidFill>
+                  <a:schemeClr val="bg1"/>
+                </a:solidFill>
+              </a:rPr>
+              <a:t>is the 2nd primary Moon phase and it is defined as the moment the Moon as reached the 1</a:t>
+            </a:r>
+            <a:r>
+              <a:rPr lang="en-US" sz="2000" baseline="30000" dirty="0">
+                <a:solidFill>
+                  <a:schemeClr val="bg1"/>
+                </a:solidFill>
+              </a:rPr>
+              <a:t>st</a:t>
+            </a:r>
+            <a:r>
+              <a:rPr lang="en-US" sz="2000" dirty="0">
+                <a:solidFill>
+                  <a:schemeClr val="bg1"/>
+                </a:solidFill>
+              </a:rPr>
+              <a:t> quarter of its orbit around the Earth, hence the name.  It is also called the Half Moon as we can see exactly 50% of the Moon’s surface illuminated.</a:t>
+            </a:r>
+          </a:p>
+        </p:txBody>
+      </p:sp>
+      <p:cxnSp>
+        <p:nvCxnSpPr>
+          <p:cNvPr id="15" name="Straight Connector 9">
+            <a:extLst>
+              <a:ext uri="{FF2B5EF4-FFF2-40B4-BE49-F238E27FC236}">
+                <a16:creationId xmlns:a16="http://schemas.microsoft.com/office/drawing/2014/main" id="{2D72A2C9-F3CA-4216-8BAD-FA4C970C3C4E}"/>
+              </a:ext>
+              <a:ext uri="{C183D7F6-B498-43B3-948B-1728B52AA6E4}">
+                <adec:decorative xmlns:adec="http://schemas.microsoft.com/office/drawing/2017/decorative" val="1"/>
+              </a:ext>
+            </a:extLst>
+          </p:cNvPr>
+          <p:cNvCxnSpPr>
+            <a:cxnSpLocks noGrp="1" noRot="1" noChangeAspect="1" noMove="1" noResize="1" noEditPoints="1" noAdjustHandles="1" noChangeArrowheads="1" noChangeShapeType="1"/>
+          </p:cNvCxnSpPr>
+          <p:nvPr>
+            <p:extLst>
+              <p:ext uri="{386F3935-93C4-4BCD-93E2-E3B085C9AB24}">
+                <p16:designElem xmlns:p16="http://schemas.microsoft.com/office/powerpoint/2015/main" val="1"/>
+              </p:ext>
+            </p:extLst>
+          </p:nvPr>
+        </p:nvCxnSpPr>
+        <p:spPr>
+          <a:xfrm>
+            <a:off x="4654296" y="2057400"/>
+            <a:ext cx="0" cy="2743200"/>
+          </a:xfrm>
+          <a:prstGeom prst="line">
+            <a:avLst/>
+          </a:prstGeom>
+          <a:ln w="19050">
+            <a:solidFill>
+              <a:schemeClr val="tx1">
+                <a:lumMod val="85000"/>
+                <a:lumOff val="15000"/>
+              </a:schemeClr>
+            </a:solidFill>
+          </a:ln>
+        </p:spPr>
+        <p:style>
+          <a:lnRef idx="1">
+            <a:schemeClr val="accent1"/>
+          </a:lnRef>
+          <a:fillRef idx="0">
+            <a:schemeClr val="accent1"/>
+          </a:fillRef>
+          <a:effectRef idx="0">
+            <a:schemeClr val="accent1"/>
+          </a:effectRef>
+          <a:fontRef idx="minor">
+            <a:schemeClr val="tx1"/>
+          </a:fontRef>
+        </p:style>
+      </p:cxnSp>
+      <p:pic>
+        <p:nvPicPr>
+          <p:cNvPr id="9" name="Content Placeholder 8">
+            <a:extLst>
+              <a:ext uri="{FF2B5EF4-FFF2-40B4-BE49-F238E27FC236}">
+                <a16:creationId xmlns:a16="http://schemas.microsoft.com/office/drawing/2014/main" id="{DDA872B1-2D96-4F56-A14B-3DCC863F00B9}"/>
+              </a:ext>
+            </a:extLst>
+          </p:cNvPr>
+          <p:cNvPicPr>
+            <a:picLocks noGrp="1" noChangeAspect="1" noChangeArrowheads="1"/>
+          </p:cNvPicPr>
+          <p:nvPr>
+            <p:ph idx="1"/>
+          </p:nvPr>
+        </p:nvPicPr>
+        <p:blipFill>
+          <a:blip r:embed="rId2">
+            <a:extLst>
+              <a:ext uri="{28A0092B-C50C-407E-A947-70E740481C1C}">
+                <a14:useLocalDpi xmlns:a14="http://schemas.microsoft.com/office/drawing/2010/main" val="0"/>
+              </a:ext>
+            </a:extLst>
+          </a:blip>
+          <a:stretch>
+            <a:fillRect/>
+          </a:stretch>
+        </p:blipFill>
+        <p:spPr bwMode="auto">
+          <a:xfrm>
+            <a:off x="694140" y="1594913"/>
+            <a:ext cx="6883129" cy="4590785"/>
+          </a:xfrm>
+          <a:prstGeom prst="rect">
+            <a:avLst/>
+          </a:prstGeom>
+          <a:noFill/>
+          <a:extLst>
+            <a:ext uri="{909E8E84-426E-40DD-AFC4-6F175D3DCCD1}">
+              <a14:hiddenFill xmlns:a14="http://schemas.microsoft.com/office/drawing/2010/main">
+                <a:solidFill>
+                  <a:srgbClr val="FFFFFF"/>
+                </a:solidFill>
+              </a14:hiddenFill>
+            </a:ext>
+          </a:extLst>
+        </p:spPr>
+      </p:pic>
+      <p:sp>
+        <p:nvSpPr>
+          <p:cNvPr id="4" name="AutoShape 2" descr="Image result for dark side of the moon">
+            <a:extLst>
+              <a:ext uri="{FF2B5EF4-FFF2-40B4-BE49-F238E27FC236}">
+                <a16:creationId xmlns:a16="http://schemas.microsoft.com/office/drawing/2014/main" id="{6CD22A2B-A41D-48DF-B82F-7BC24EFB3944}"/>
+              </a:ext>
+            </a:extLst>
+          </p:cNvPr>
+          <p:cNvSpPr>
+            <a:spLocks noChangeAspect="1" noChangeArrowheads="1"/>
+          </p:cNvSpPr>
+          <p:nvPr/>
+        </p:nvSpPr>
+        <p:spPr bwMode="auto">
+          <a:xfrm>
+            <a:off x="5943600" y="3276600"/>
+            <a:ext cx="304800" cy="304800"/>
+          </a:xfrm>
+          <a:prstGeom prst="rect">
+            <a:avLst/>
+          </a:prstGeom>
+          <a:noFill/>
+          <a:extLst>
+            <a:ext uri="{909E8E84-426E-40DD-AFC4-6F175D3DCCD1}">
+              <a14:hiddenFill xmlns:a14="http://schemas.microsoft.com/office/drawing/2010/main">
+                <a:solidFill>
+                  <a:srgbClr val="FFFFFF"/>
+                </a:solidFill>
+              </a14:hiddenFill>
+            </a:ext>
+          </a:extLst>
+        </p:spPr>
+        <p:txBody>
+          <a:bodyPr vert="horz" wrap="square" lIns="91440" tIns="45720" rIns="91440" bIns="45720" numCol="1" anchor="t" anchorCtr="0" compatLnSpc="1">
+            <a:prstTxWarp prst="textNoShape">
+              <a:avLst/>
+            </a:prstTxWarp>
+          </a:bodyPr>
+          <a:lstStyle/>
+          <a:p>
+            <a:endParaRPr lang="en-US"/>
+          </a:p>
+        </p:txBody>
+      </p:sp>
+    </p:spTree>
+    <p:extLst>
+      <p:ext uri="{BB962C8B-B14F-4D97-AF65-F5344CB8AC3E}">
+        <p14:creationId xmlns:p14="http://schemas.microsoft.com/office/powerpoint/2010/main" val="884811407"/>
       </p:ext>
     </p:extLst>
   </p:cSld>

</xml_diff>